<commit_message>
Add a slide explaining the single buffer based RPC protocol
</commit_message>
<xml_diff>
--- a/doc/Single Communication Buffer Based RPC Model.pptx
+++ b/doc/Single Communication Buffer Based RPC Model.pptx
@@ -6,6 +6,7 @@
   </p:sldMasterIdLst>
   <p:sldIdLst>
     <p:sldId id="256" r:id="rId2"/>
+    <p:sldId id="257" r:id="rId3"/>
   </p:sldIdLst>
   <p:sldSz cx="12192000" cy="6858000"/>
   <p:notesSz cx="6858000" cy="9144000"/>
@@ -115,6 +116,7 @@
 <file path=ppt/revisionInfo.xml><?xml version="1.0" encoding="utf-8"?>
 <p1510:revInfo xmlns:a="http://schemas.openxmlformats.org/drawingml/2006/main" xmlns:r="http://schemas.openxmlformats.org/officeDocument/2006/relationships" xmlns:p1510="http://schemas.microsoft.com/office/powerpoint/2015/10/main">
   <p1510:revLst>
+    <p1510:client id="{6F8FD5B7-3F20-483A-A14D-DB24B9FBE73D}" v="328" dt="2021-07-25T14:18:53.733"/>
     <p1510:client id="{D6AB13BE-EE0D-4238-9597-DB02E4C747E4}" v="697" dt="2021-07-24T15:00:55.996"/>
   </p1510:revLst>
 </p1510:revInfo>
@@ -249,7 +251,7 @@
           <a:p>
             <a:fld id="{2566825D-2B69-4989-8861-A6901ABADB6C}" type="datetimeFigureOut">
               <a:rPr lang="ko-KR" altLang="en-US" smtClean="0"/>
-              <a:t>2021-07-24</a:t>
+              <a:t>2021-07-25</a:t>
             </a:fld>
             <a:endParaRPr lang="ko-KR" altLang="en-US"/>
           </a:p>
@@ -417,7 +419,7 @@
           <a:p>
             <a:fld id="{2566825D-2B69-4989-8861-A6901ABADB6C}" type="datetimeFigureOut">
               <a:rPr lang="ko-KR" altLang="en-US" smtClean="0"/>
-              <a:t>2021-07-24</a:t>
+              <a:t>2021-07-25</a:t>
             </a:fld>
             <a:endParaRPr lang="ko-KR" altLang="en-US"/>
           </a:p>
@@ -595,7 +597,7 @@
           <a:p>
             <a:fld id="{2566825D-2B69-4989-8861-A6901ABADB6C}" type="datetimeFigureOut">
               <a:rPr lang="ko-KR" altLang="en-US" smtClean="0"/>
-              <a:t>2021-07-24</a:t>
+              <a:t>2021-07-25</a:t>
             </a:fld>
             <a:endParaRPr lang="ko-KR" altLang="en-US"/>
           </a:p>
@@ -763,7 +765,7 @@
           <a:p>
             <a:fld id="{2566825D-2B69-4989-8861-A6901ABADB6C}" type="datetimeFigureOut">
               <a:rPr lang="ko-KR" altLang="en-US" smtClean="0"/>
-              <a:t>2021-07-24</a:t>
+              <a:t>2021-07-25</a:t>
             </a:fld>
             <a:endParaRPr lang="ko-KR" altLang="en-US"/>
           </a:p>
@@ -1008,7 +1010,7 @@
           <a:p>
             <a:fld id="{2566825D-2B69-4989-8861-A6901ABADB6C}" type="datetimeFigureOut">
               <a:rPr lang="ko-KR" altLang="en-US" smtClean="0"/>
-              <a:t>2021-07-24</a:t>
+              <a:t>2021-07-25</a:t>
             </a:fld>
             <a:endParaRPr lang="ko-KR" altLang="en-US"/>
           </a:p>
@@ -1237,7 +1239,7 @@
           <a:p>
             <a:fld id="{2566825D-2B69-4989-8861-A6901ABADB6C}" type="datetimeFigureOut">
               <a:rPr lang="ko-KR" altLang="en-US" smtClean="0"/>
-              <a:t>2021-07-24</a:t>
+              <a:t>2021-07-25</a:t>
             </a:fld>
             <a:endParaRPr lang="ko-KR" altLang="en-US"/>
           </a:p>
@@ -1601,7 +1603,7 @@
           <a:p>
             <a:fld id="{2566825D-2B69-4989-8861-A6901ABADB6C}" type="datetimeFigureOut">
               <a:rPr lang="ko-KR" altLang="en-US" smtClean="0"/>
-              <a:t>2021-07-24</a:t>
+              <a:t>2021-07-25</a:t>
             </a:fld>
             <a:endParaRPr lang="ko-KR" altLang="en-US"/>
           </a:p>
@@ -1718,7 +1720,7 @@
           <a:p>
             <a:fld id="{2566825D-2B69-4989-8861-A6901ABADB6C}" type="datetimeFigureOut">
               <a:rPr lang="ko-KR" altLang="en-US" smtClean="0"/>
-              <a:t>2021-07-24</a:t>
+              <a:t>2021-07-25</a:t>
             </a:fld>
             <a:endParaRPr lang="ko-KR" altLang="en-US"/>
           </a:p>
@@ -1813,7 +1815,7 @@
           <a:p>
             <a:fld id="{2566825D-2B69-4989-8861-A6901ABADB6C}" type="datetimeFigureOut">
               <a:rPr lang="ko-KR" altLang="en-US" smtClean="0"/>
-              <a:t>2021-07-24</a:t>
+              <a:t>2021-07-25</a:t>
             </a:fld>
             <a:endParaRPr lang="ko-KR" altLang="en-US"/>
           </a:p>
@@ -2088,7 +2090,7 @@
           <a:p>
             <a:fld id="{2566825D-2B69-4989-8861-A6901ABADB6C}" type="datetimeFigureOut">
               <a:rPr lang="ko-KR" altLang="en-US" smtClean="0"/>
-              <a:t>2021-07-24</a:t>
+              <a:t>2021-07-25</a:t>
             </a:fld>
             <a:endParaRPr lang="ko-KR" altLang="en-US"/>
           </a:p>
@@ -2340,7 +2342,7 @@
           <a:p>
             <a:fld id="{2566825D-2B69-4989-8861-A6901ABADB6C}" type="datetimeFigureOut">
               <a:rPr lang="ko-KR" altLang="en-US" smtClean="0"/>
-              <a:t>2021-07-24</a:t>
+              <a:t>2021-07-25</a:t>
             </a:fld>
             <a:endParaRPr lang="ko-KR" altLang="en-US"/>
           </a:p>
@@ -2551,7 +2553,7 @@
           <a:p>
             <a:fld id="{2566825D-2B69-4989-8861-A6901ABADB6C}" type="datetimeFigureOut">
               <a:rPr lang="ko-KR" altLang="en-US" smtClean="0"/>
-              <a:t>2021-07-24</a:t>
+              <a:t>2021-07-25</a:t>
             </a:fld>
             <a:endParaRPr lang="ko-KR" altLang="en-US"/>
           </a:p>
@@ -5045,6 +5047,1108 @@
 </p:sld>
 </file>
 
+<file path=ppt/slides/slide2.xml><?xml version="1.0" encoding="utf-8"?>
+<p:sld xmlns:a="http://schemas.openxmlformats.org/drawingml/2006/main" xmlns:r="http://schemas.openxmlformats.org/officeDocument/2006/relationships" xmlns:p="http://schemas.openxmlformats.org/presentationml/2006/main">
+  <p:cSld>
+    <p:spTree>
+      <p:nvGrpSpPr>
+        <p:cNvPr id="1" name=""/>
+        <p:cNvGrpSpPr/>
+        <p:nvPr/>
+      </p:nvGrpSpPr>
+      <p:grpSpPr>
+        <a:xfrm>
+          <a:off x="0" y="0"/>
+          <a:ext cx="0" cy="0"/>
+          <a:chOff x="0" y="0"/>
+          <a:chExt cx="0" cy="0"/>
+        </a:xfrm>
+      </p:grpSpPr>
+      <p:cxnSp>
+        <p:nvCxnSpPr>
+          <p:cNvPr id="4" name="직선 화살표 연결선 3">
+            <a:extLst>
+              <a:ext uri="{FF2B5EF4-FFF2-40B4-BE49-F238E27FC236}">
+                <a16:creationId xmlns:a16="http://schemas.microsoft.com/office/drawing/2014/main" id="{55052F72-82D5-445D-A88A-F394299FD6F0}"/>
+              </a:ext>
+            </a:extLst>
+          </p:cNvPr>
+          <p:cNvCxnSpPr/>
+          <p:nvPr/>
+        </p:nvCxnSpPr>
+        <p:spPr>
+          <a:xfrm>
+            <a:off x="3184713" y="1727948"/>
+            <a:ext cx="56029" cy="4628028"/>
+          </a:xfrm>
+          <a:prstGeom prst="straightConnector1">
+            <a:avLst/>
+          </a:prstGeom>
+        </p:spPr>
+        <p:style>
+          <a:lnRef idx="1">
+            <a:schemeClr val="accent1"/>
+          </a:lnRef>
+          <a:fillRef idx="0">
+            <a:schemeClr val="accent1"/>
+          </a:fillRef>
+          <a:effectRef idx="0">
+            <a:schemeClr val="accent1"/>
+          </a:effectRef>
+          <a:fontRef idx="minor">
+            <a:schemeClr val="tx1"/>
+          </a:fontRef>
+        </p:style>
+      </p:cxnSp>
+      <p:cxnSp>
+        <p:nvCxnSpPr>
+          <p:cNvPr id="5" name="직선 화살표 연결선 4">
+            <a:extLst>
+              <a:ext uri="{FF2B5EF4-FFF2-40B4-BE49-F238E27FC236}">
+                <a16:creationId xmlns:a16="http://schemas.microsoft.com/office/drawing/2014/main" id="{E5777621-DDBA-4CAB-A015-1D46FB598744}"/>
+              </a:ext>
+            </a:extLst>
+          </p:cNvPr>
+          <p:cNvCxnSpPr>
+            <a:cxnSpLocks/>
+          </p:cNvCxnSpPr>
+          <p:nvPr/>
+        </p:nvCxnSpPr>
+        <p:spPr>
+          <a:xfrm>
+            <a:off x="8249771" y="1727948"/>
+            <a:ext cx="56029" cy="4628028"/>
+          </a:xfrm>
+          <a:prstGeom prst="straightConnector1">
+            <a:avLst/>
+          </a:prstGeom>
+        </p:spPr>
+        <p:style>
+          <a:lnRef idx="1">
+            <a:schemeClr val="accent1"/>
+          </a:lnRef>
+          <a:fillRef idx="0">
+            <a:schemeClr val="accent1"/>
+          </a:fillRef>
+          <a:effectRef idx="0">
+            <a:schemeClr val="accent1"/>
+          </a:effectRef>
+          <a:fontRef idx="minor">
+            <a:schemeClr val="tx1"/>
+          </a:fontRef>
+        </p:style>
+      </p:cxnSp>
+      <p:sp>
+        <p:nvSpPr>
+          <p:cNvPr id="7" name="직사각형 6">
+            <a:extLst>
+              <a:ext uri="{FF2B5EF4-FFF2-40B4-BE49-F238E27FC236}">
+                <a16:creationId xmlns:a16="http://schemas.microsoft.com/office/drawing/2014/main" id="{B5CEE224-4D30-4DEC-B6A0-874A89C9BAC8}"/>
+              </a:ext>
+            </a:extLst>
+          </p:cNvPr>
+          <p:cNvSpPr/>
+          <p:nvPr/>
+        </p:nvSpPr>
+        <p:spPr>
+          <a:xfrm>
+            <a:off x="2529000" y="1209583"/>
+            <a:ext cx="1367551" cy="484800"/>
+          </a:xfrm>
+          <a:prstGeom prst="rect">
+            <a:avLst/>
+          </a:prstGeom>
+          <a:noFill/>
+        </p:spPr>
+        <p:style>
+          <a:lnRef idx="2">
+            <a:schemeClr val="accent1">
+              <a:shade val="50000"/>
+            </a:schemeClr>
+          </a:lnRef>
+          <a:fillRef idx="1">
+            <a:schemeClr val="accent1"/>
+          </a:fillRef>
+          <a:effectRef idx="0">
+            <a:schemeClr val="accent1"/>
+          </a:effectRef>
+          <a:fontRef idx="minor">
+            <a:schemeClr val="lt1"/>
+          </a:fontRef>
+        </p:style>
+        <p:txBody>
+          <a:bodyPr lIns="91440" tIns="45720" rIns="91440" bIns="45720" rtlCol="0" anchor="ctr"/>
+          <a:lstStyle/>
+          <a:p>
+            <a:pPr algn="ctr"/>
+            <a:r>
+              <a:rPr lang="ko-KR" altLang="en-US" sz="1200" dirty="0" err="1">
+                <a:solidFill>
+                  <a:schemeClr val="tx1">
+                    <a:lumMod val="95000"/>
+                    <a:lumOff val="5000"/>
+                  </a:schemeClr>
+                </a:solidFill>
+                <a:ea typeface="맑은 고딕"/>
+              </a:rPr>
+              <a:t>Client</a:t>
+            </a:r>
+            <a:endParaRPr lang="ko-KR" altLang="en-US" sz="1200">
+              <a:solidFill>
+                <a:schemeClr val="tx1">
+                  <a:lumMod val="95000"/>
+                  <a:lumOff val="5000"/>
+                </a:schemeClr>
+              </a:solidFill>
+              <a:ea typeface="맑은 고딕"/>
+            </a:endParaRPr>
+          </a:p>
+        </p:txBody>
+      </p:sp>
+      <p:sp>
+        <p:nvSpPr>
+          <p:cNvPr id="8" name="직사각형 7">
+            <a:extLst>
+              <a:ext uri="{FF2B5EF4-FFF2-40B4-BE49-F238E27FC236}">
+                <a16:creationId xmlns:a16="http://schemas.microsoft.com/office/drawing/2014/main" id="{9D2FE6FD-3E80-413B-908F-3797F0435C8C}"/>
+              </a:ext>
+            </a:extLst>
+          </p:cNvPr>
+          <p:cNvSpPr/>
+          <p:nvPr/>
+        </p:nvSpPr>
+        <p:spPr>
+          <a:xfrm>
+            <a:off x="7515617" y="1209583"/>
+            <a:ext cx="1367551" cy="484800"/>
+          </a:xfrm>
+          <a:prstGeom prst="rect">
+            <a:avLst/>
+          </a:prstGeom>
+          <a:noFill/>
+        </p:spPr>
+        <p:style>
+          <a:lnRef idx="2">
+            <a:schemeClr val="accent1">
+              <a:shade val="50000"/>
+            </a:schemeClr>
+          </a:lnRef>
+          <a:fillRef idx="1">
+            <a:schemeClr val="accent1"/>
+          </a:fillRef>
+          <a:effectRef idx="0">
+            <a:schemeClr val="accent1"/>
+          </a:effectRef>
+          <a:fontRef idx="minor">
+            <a:schemeClr val="lt1"/>
+          </a:fontRef>
+        </p:style>
+        <p:txBody>
+          <a:bodyPr lIns="91440" tIns="45720" rIns="91440" bIns="45720" rtlCol="0" anchor="ctr"/>
+          <a:lstStyle/>
+          <a:p>
+            <a:pPr algn="ctr"/>
+            <a:r>
+              <a:rPr lang="ko-KR" altLang="en-US" sz="1200" dirty="0">
+                <a:solidFill>
+                  <a:schemeClr val="tx1">
+                    <a:lumMod val="95000"/>
+                    <a:lumOff val="5000"/>
+                  </a:schemeClr>
+                </a:solidFill>
+                <a:ea typeface="맑은 고딕"/>
+              </a:rPr>
+              <a:t>Server</a:t>
+            </a:r>
+          </a:p>
+        </p:txBody>
+      </p:sp>
+      <p:cxnSp>
+        <p:nvCxnSpPr>
+          <p:cNvPr id="9" name="직선 화살표 연결선 8">
+            <a:extLst>
+              <a:ext uri="{FF2B5EF4-FFF2-40B4-BE49-F238E27FC236}">
+                <a16:creationId xmlns:a16="http://schemas.microsoft.com/office/drawing/2014/main" id="{7EF7DCB8-0172-4255-A96A-66548D2BF29C}"/>
+              </a:ext>
+            </a:extLst>
+          </p:cNvPr>
+          <p:cNvCxnSpPr/>
+          <p:nvPr/>
+        </p:nvCxnSpPr>
+        <p:spPr>
+          <a:xfrm flipH="1">
+            <a:off x="3180231" y="2097742"/>
+            <a:ext cx="5047128" cy="454959"/>
+          </a:xfrm>
+          <a:prstGeom prst="straightConnector1">
+            <a:avLst/>
+          </a:prstGeom>
+          <a:ln>
+            <a:tailEnd type="triangle"/>
+          </a:ln>
+        </p:spPr>
+        <p:style>
+          <a:lnRef idx="1">
+            <a:schemeClr val="accent1"/>
+          </a:lnRef>
+          <a:fillRef idx="0">
+            <a:schemeClr val="accent1"/>
+          </a:fillRef>
+          <a:effectRef idx="0">
+            <a:schemeClr val="accent1"/>
+          </a:effectRef>
+          <a:fontRef idx="minor">
+            <a:schemeClr val="tx1"/>
+          </a:fontRef>
+        </p:style>
+      </p:cxnSp>
+      <p:sp>
+        <p:nvSpPr>
+          <p:cNvPr id="12" name="TextBox 11">
+            <a:extLst>
+              <a:ext uri="{FF2B5EF4-FFF2-40B4-BE49-F238E27FC236}">
+                <a16:creationId xmlns:a16="http://schemas.microsoft.com/office/drawing/2014/main" id="{8C3F34EE-E197-48FE-A36E-AD36E1DD6BBB}"/>
+              </a:ext>
+            </a:extLst>
+          </p:cNvPr>
+          <p:cNvSpPr txBox="1"/>
+          <p:nvPr/>
+        </p:nvSpPr>
+        <p:spPr>
+          <a:xfrm>
+            <a:off x="5374341" y="2092699"/>
+            <a:ext cx="657225" cy="246221"/>
+          </a:xfrm>
+          <a:prstGeom prst="rect">
+            <a:avLst/>
+          </a:prstGeom>
+          <a:noFill/>
+        </p:spPr>
+        <p:txBody>
+          <a:bodyPr rot="0" spcFirstLastPara="0" vertOverflow="overflow" horzOverflow="overflow" vert="horz" wrap="square" lIns="91440" tIns="45720" rIns="91440" bIns="45720" numCol="1" spcCol="0" rtlCol="0" fromWordArt="0" anchor="t" anchorCtr="0" forceAA="0" compatLnSpc="1">
+            <a:prstTxWarp prst="textNoShape">
+              <a:avLst/>
+            </a:prstTxWarp>
+            <a:spAutoFit/>
+          </a:bodyPr>
+          <a:lstStyle/>
+          <a:p>
+            <a:pPr algn="l"/>
+            <a:r>
+              <a:rPr lang="ko-KR" altLang="en-US" sz="1000" dirty="0" err="1">
+                <a:ea typeface="맑은 고딕"/>
+              </a:rPr>
+              <a:t>Ready</a:t>
+            </a:r>
+            <a:endParaRPr lang="ko-KR" sz="1000" dirty="0" err="1">
+              <a:ea typeface="맑은 고딕"/>
+            </a:endParaRPr>
+          </a:p>
+        </p:txBody>
+      </p:sp>
+      <p:cxnSp>
+        <p:nvCxnSpPr>
+          <p:cNvPr id="13" name="직선 화살표 연결선 12">
+            <a:extLst>
+              <a:ext uri="{FF2B5EF4-FFF2-40B4-BE49-F238E27FC236}">
+                <a16:creationId xmlns:a16="http://schemas.microsoft.com/office/drawing/2014/main" id="{434E0502-A33A-41FB-BDFD-337F8733E740}"/>
+              </a:ext>
+            </a:extLst>
+          </p:cNvPr>
+          <p:cNvCxnSpPr>
+            <a:cxnSpLocks/>
+          </p:cNvCxnSpPr>
+          <p:nvPr/>
+        </p:nvCxnSpPr>
+        <p:spPr>
+          <a:xfrm>
+            <a:off x="3173506" y="2725270"/>
+            <a:ext cx="5094195" cy="354107"/>
+          </a:xfrm>
+          <a:prstGeom prst="straightConnector1">
+            <a:avLst/>
+          </a:prstGeom>
+          <a:ln>
+            <a:tailEnd type="triangle"/>
+          </a:ln>
+        </p:spPr>
+        <p:style>
+          <a:lnRef idx="1">
+            <a:schemeClr val="accent1"/>
+          </a:lnRef>
+          <a:fillRef idx="0">
+            <a:schemeClr val="accent1"/>
+          </a:fillRef>
+          <a:effectRef idx="0">
+            <a:schemeClr val="accent1"/>
+          </a:effectRef>
+          <a:fontRef idx="minor">
+            <a:schemeClr val="tx1"/>
+          </a:fontRef>
+        </p:style>
+      </p:cxnSp>
+      <p:cxnSp>
+        <p:nvCxnSpPr>
+          <p:cNvPr id="14" name="직선 화살표 연결선 13">
+            <a:extLst>
+              <a:ext uri="{FF2B5EF4-FFF2-40B4-BE49-F238E27FC236}">
+                <a16:creationId xmlns:a16="http://schemas.microsoft.com/office/drawing/2014/main" id="{AB7EEF2F-2B11-40D4-A2FA-E82C724036FB}"/>
+              </a:ext>
+            </a:extLst>
+          </p:cNvPr>
+          <p:cNvCxnSpPr>
+            <a:cxnSpLocks/>
+          </p:cNvCxnSpPr>
+          <p:nvPr/>
+        </p:nvCxnSpPr>
+        <p:spPr>
+          <a:xfrm flipH="1">
+            <a:off x="3202642" y="3487270"/>
+            <a:ext cx="5047128" cy="454959"/>
+          </a:xfrm>
+          <a:prstGeom prst="straightConnector1">
+            <a:avLst/>
+          </a:prstGeom>
+          <a:ln>
+            <a:tailEnd type="triangle"/>
+          </a:ln>
+        </p:spPr>
+        <p:style>
+          <a:lnRef idx="1">
+            <a:schemeClr val="accent1"/>
+          </a:lnRef>
+          <a:fillRef idx="0">
+            <a:schemeClr val="accent1"/>
+          </a:fillRef>
+          <a:effectRef idx="0">
+            <a:schemeClr val="accent1"/>
+          </a:effectRef>
+          <a:fontRef idx="minor">
+            <a:schemeClr val="tx1"/>
+          </a:fontRef>
+        </p:style>
+      </p:cxnSp>
+      <p:cxnSp>
+        <p:nvCxnSpPr>
+          <p:cNvPr id="15" name="직선 화살표 연결선 14">
+            <a:extLst>
+              <a:ext uri="{FF2B5EF4-FFF2-40B4-BE49-F238E27FC236}">
+                <a16:creationId xmlns:a16="http://schemas.microsoft.com/office/drawing/2014/main" id="{E8E9AF53-EAF8-47AB-AC7C-8C5245D7FA27}"/>
+              </a:ext>
+            </a:extLst>
+          </p:cNvPr>
+          <p:cNvCxnSpPr>
+            <a:cxnSpLocks/>
+          </p:cNvCxnSpPr>
+          <p:nvPr/>
+        </p:nvCxnSpPr>
+        <p:spPr>
+          <a:xfrm flipH="1">
+            <a:off x="3202642" y="4473389"/>
+            <a:ext cx="5047128" cy="454959"/>
+          </a:xfrm>
+          <a:prstGeom prst="straightConnector1">
+            <a:avLst/>
+          </a:prstGeom>
+          <a:ln>
+            <a:tailEnd type="triangle"/>
+          </a:ln>
+        </p:spPr>
+        <p:style>
+          <a:lnRef idx="1">
+            <a:schemeClr val="accent1"/>
+          </a:lnRef>
+          <a:fillRef idx="0">
+            <a:schemeClr val="accent1"/>
+          </a:fillRef>
+          <a:effectRef idx="0">
+            <a:schemeClr val="accent1"/>
+          </a:effectRef>
+          <a:fontRef idx="minor">
+            <a:schemeClr val="tx1"/>
+          </a:fontRef>
+        </p:style>
+      </p:cxnSp>
+      <p:sp>
+        <p:nvSpPr>
+          <p:cNvPr id="16" name="TextBox 15">
+            <a:extLst>
+              <a:ext uri="{FF2B5EF4-FFF2-40B4-BE49-F238E27FC236}">
+                <a16:creationId xmlns:a16="http://schemas.microsoft.com/office/drawing/2014/main" id="{B144893D-C966-4DB2-8186-6CF40B1EB8EC}"/>
+              </a:ext>
+            </a:extLst>
+          </p:cNvPr>
+          <p:cNvSpPr txBox="1"/>
+          <p:nvPr/>
+        </p:nvSpPr>
+        <p:spPr>
+          <a:xfrm>
+            <a:off x="5374341" y="2664198"/>
+            <a:ext cx="657225" cy="246221"/>
+          </a:xfrm>
+          <a:prstGeom prst="rect">
+            <a:avLst/>
+          </a:prstGeom>
+          <a:noFill/>
+        </p:spPr>
+        <p:txBody>
+          <a:bodyPr rot="0" spcFirstLastPara="0" vertOverflow="overflow" horzOverflow="overflow" vert="horz" wrap="square" lIns="91440" tIns="45720" rIns="91440" bIns="45720" numCol="1" spcCol="0" rtlCol="0" fromWordArt="0" anchor="t" anchorCtr="0" forceAA="0" compatLnSpc="1">
+            <a:prstTxWarp prst="textNoShape">
+              <a:avLst/>
+            </a:prstTxWarp>
+            <a:spAutoFit/>
+          </a:bodyPr>
+          <a:lstStyle/>
+          <a:p>
+            <a:pPr algn="l"/>
+            <a:r>
+              <a:rPr lang="ko-KR" altLang="en-US" sz="1000" dirty="0" err="1">
+                <a:ea typeface="맑은 고딕"/>
+              </a:rPr>
+              <a:t>Request</a:t>
+            </a:r>
+            <a:endParaRPr lang="ko-KR" sz="1000" dirty="0" err="1">
+              <a:ea typeface="맑은 고딕"/>
+            </a:endParaRPr>
+          </a:p>
+        </p:txBody>
+      </p:sp>
+      <p:sp>
+        <p:nvSpPr>
+          <p:cNvPr id="17" name="TextBox 16">
+            <a:extLst>
+              <a:ext uri="{FF2B5EF4-FFF2-40B4-BE49-F238E27FC236}">
+                <a16:creationId xmlns:a16="http://schemas.microsoft.com/office/drawing/2014/main" id="{C3C92D00-47DE-48F9-A477-E65438929F9F}"/>
+              </a:ext>
+            </a:extLst>
+          </p:cNvPr>
+          <p:cNvSpPr txBox="1"/>
+          <p:nvPr/>
+        </p:nvSpPr>
+        <p:spPr>
+          <a:xfrm>
+            <a:off x="5374341" y="3471022"/>
+            <a:ext cx="657225" cy="246221"/>
+          </a:xfrm>
+          <a:prstGeom prst="rect">
+            <a:avLst/>
+          </a:prstGeom>
+          <a:noFill/>
+        </p:spPr>
+        <p:txBody>
+          <a:bodyPr rot="0" spcFirstLastPara="0" vertOverflow="overflow" horzOverflow="overflow" vert="horz" wrap="square" lIns="91440" tIns="45720" rIns="91440" bIns="45720" numCol="1" spcCol="0" rtlCol="0" fromWordArt="0" anchor="t" anchorCtr="0" forceAA="0" compatLnSpc="1">
+            <a:prstTxWarp prst="textNoShape">
+              <a:avLst/>
+            </a:prstTxWarp>
+            <a:spAutoFit/>
+          </a:bodyPr>
+          <a:lstStyle/>
+          <a:p>
+            <a:pPr algn="l"/>
+            <a:r>
+              <a:rPr lang="ko-KR" altLang="en-US" sz="1000" dirty="0" err="1">
+                <a:ea typeface="맑은 고딕"/>
+              </a:rPr>
+              <a:t>Accept</a:t>
+            </a:r>
+            <a:endParaRPr lang="ko-KR" sz="1000" dirty="0" err="1">
+              <a:ea typeface="맑은 고딕"/>
+            </a:endParaRPr>
+          </a:p>
+        </p:txBody>
+      </p:sp>
+      <p:sp>
+        <p:nvSpPr>
+          <p:cNvPr id="18" name="TextBox 17">
+            <a:extLst>
+              <a:ext uri="{FF2B5EF4-FFF2-40B4-BE49-F238E27FC236}">
+                <a16:creationId xmlns:a16="http://schemas.microsoft.com/office/drawing/2014/main" id="{66883F30-A6EE-4171-AF37-39D8B907DF3E}"/>
+              </a:ext>
+            </a:extLst>
+          </p:cNvPr>
+          <p:cNvSpPr txBox="1"/>
+          <p:nvPr/>
+        </p:nvSpPr>
+        <p:spPr>
+          <a:xfrm>
+            <a:off x="4802841" y="4457140"/>
+            <a:ext cx="657225" cy="246221"/>
+          </a:xfrm>
+          <a:prstGeom prst="rect">
+            <a:avLst/>
+          </a:prstGeom>
+          <a:noFill/>
+        </p:spPr>
+        <p:txBody>
+          <a:bodyPr rot="0" spcFirstLastPara="0" vertOverflow="overflow" horzOverflow="overflow" vert="horz" wrap="square" lIns="91440" tIns="45720" rIns="91440" bIns="45720" numCol="1" spcCol="0" rtlCol="0" fromWordArt="0" anchor="t" anchorCtr="0" forceAA="0" compatLnSpc="1">
+            <a:prstTxWarp prst="textNoShape">
+              <a:avLst/>
+            </a:prstTxWarp>
+            <a:spAutoFit/>
+          </a:bodyPr>
+          <a:lstStyle/>
+          <a:p>
+            <a:pPr algn="l"/>
+            <a:r>
+              <a:rPr lang="ko-KR" altLang="en-US" sz="1000" dirty="0" err="1">
+                <a:ea typeface="맑은 고딕"/>
+              </a:rPr>
+              <a:t>Finish</a:t>
+            </a:r>
+            <a:endParaRPr lang="ko-KR" sz="1000" dirty="0" err="1">
+              <a:ea typeface="맑은 고딕"/>
+            </a:endParaRPr>
+          </a:p>
+        </p:txBody>
+      </p:sp>
+      <p:sp>
+        <p:nvSpPr>
+          <p:cNvPr id="20" name="TextBox 19">
+            <a:extLst>
+              <a:ext uri="{FF2B5EF4-FFF2-40B4-BE49-F238E27FC236}">
+                <a16:creationId xmlns:a16="http://schemas.microsoft.com/office/drawing/2014/main" id="{E0C264EE-4FD6-4DC9-9F0E-E53F6CEF5B32}"/>
+              </a:ext>
+            </a:extLst>
+          </p:cNvPr>
+          <p:cNvSpPr txBox="1"/>
+          <p:nvPr/>
+        </p:nvSpPr>
+        <p:spPr>
+          <a:xfrm>
+            <a:off x="5262282" y="4457139"/>
+            <a:ext cx="1520077" cy="246221"/>
+          </a:xfrm>
+          <a:prstGeom prst="rect">
+            <a:avLst/>
+          </a:prstGeom>
+          <a:noFill/>
+        </p:spPr>
+        <p:txBody>
+          <a:bodyPr rot="0" spcFirstLastPara="0" vertOverflow="overflow" horzOverflow="overflow" vert="horz" wrap="square" lIns="91440" tIns="45720" rIns="91440" bIns="45720" numCol="1" spcCol="0" rtlCol="0" fromWordArt="0" anchor="t" anchorCtr="0" forceAA="0" compatLnSpc="1">
+            <a:prstTxWarp prst="textNoShape">
+              <a:avLst/>
+            </a:prstTxWarp>
+            <a:spAutoFit/>
+          </a:bodyPr>
+          <a:lstStyle/>
+          <a:p>
+            <a:r>
+              <a:rPr lang="ko-KR" altLang="en-US" sz="1000" dirty="0" err="1">
+                <a:ea typeface="맑은 고딕"/>
+              </a:rPr>
+              <a:t>or</a:t>
+            </a:r>
+            <a:r>
+              <a:rPr lang="ko-KR" altLang="en-US" sz="1000" dirty="0">
+                <a:ea typeface="맑은 고딕"/>
+              </a:rPr>
+              <a:t> (</a:t>
+            </a:r>
+            <a:r>
+              <a:rPr lang="ko-KR" altLang="en-US" sz="1000" dirty="0" err="1">
+                <a:ea typeface="맑은 고딕"/>
+              </a:rPr>
+              <a:t>Error</a:t>
+            </a:r>
+            <a:r>
+              <a:rPr lang="ko-KR" altLang="en-US" sz="1000" dirty="0">
+                <a:ea typeface="맑은 고딕"/>
+              </a:rPr>
+              <a:t>, </a:t>
+            </a:r>
+            <a:r>
+              <a:rPr lang="ko-KR" altLang="en-US" sz="1000" dirty="0" err="1">
+                <a:ea typeface="맑은 고딕"/>
+              </a:rPr>
+              <a:t>Undefined</a:t>
+            </a:r>
+            <a:r>
+              <a:rPr lang="ko-KR" altLang="en-US" sz="1000" dirty="0">
+                <a:ea typeface="맑은 고딕"/>
+              </a:rPr>
+              <a:t>)</a:t>
+            </a:r>
+            <a:endParaRPr lang="ko-KR" sz="1000" dirty="0" err="1">
+              <a:ea typeface="맑은 고딕"/>
+            </a:endParaRPr>
+          </a:p>
+        </p:txBody>
+      </p:sp>
+      <p:cxnSp>
+        <p:nvCxnSpPr>
+          <p:cNvPr id="21" name="직선 화살표 연결선 20">
+            <a:extLst>
+              <a:ext uri="{FF2B5EF4-FFF2-40B4-BE49-F238E27FC236}">
+                <a16:creationId xmlns:a16="http://schemas.microsoft.com/office/drawing/2014/main" id="{A707855E-C566-48E1-AF67-940FBDB812C0}"/>
+              </a:ext>
+            </a:extLst>
+          </p:cNvPr>
+          <p:cNvCxnSpPr>
+            <a:cxnSpLocks/>
+          </p:cNvCxnSpPr>
+          <p:nvPr/>
+        </p:nvCxnSpPr>
+        <p:spPr>
+          <a:xfrm>
+            <a:off x="3207123" y="5168152"/>
+            <a:ext cx="5094195" cy="354107"/>
+          </a:xfrm>
+          <a:prstGeom prst="straightConnector1">
+            <a:avLst/>
+          </a:prstGeom>
+          <a:ln>
+            <a:tailEnd type="triangle"/>
+          </a:ln>
+        </p:spPr>
+        <p:style>
+          <a:lnRef idx="1">
+            <a:schemeClr val="accent1"/>
+          </a:lnRef>
+          <a:fillRef idx="0">
+            <a:schemeClr val="accent1"/>
+          </a:fillRef>
+          <a:effectRef idx="0">
+            <a:schemeClr val="accent1"/>
+          </a:effectRef>
+          <a:fontRef idx="minor">
+            <a:schemeClr val="tx1"/>
+          </a:fontRef>
+        </p:style>
+      </p:cxnSp>
+      <p:cxnSp>
+        <p:nvCxnSpPr>
+          <p:cNvPr id="22" name="직선 화살표 연결선 21">
+            <a:extLst>
+              <a:ext uri="{FF2B5EF4-FFF2-40B4-BE49-F238E27FC236}">
+                <a16:creationId xmlns:a16="http://schemas.microsoft.com/office/drawing/2014/main" id="{5214C3F1-435B-4A39-A9FF-7FC9172BD0D3}"/>
+              </a:ext>
+            </a:extLst>
+          </p:cNvPr>
+          <p:cNvCxnSpPr>
+            <a:cxnSpLocks/>
+          </p:cNvCxnSpPr>
+          <p:nvPr/>
+        </p:nvCxnSpPr>
+        <p:spPr>
+          <a:xfrm flipH="1">
+            <a:off x="3213848" y="5773271"/>
+            <a:ext cx="5047128" cy="454959"/>
+          </a:xfrm>
+          <a:prstGeom prst="straightConnector1">
+            <a:avLst/>
+          </a:prstGeom>
+          <a:ln>
+            <a:tailEnd type="triangle"/>
+          </a:ln>
+        </p:spPr>
+        <p:style>
+          <a:lnRef idx="1">
+            <a:schemeClr val="accent1"/>
+          </a:lnRef>
+          <a:fillRef idx="0">
+            <a:schemeClr val="accent1"/>
+          </a:fillRef>
+          <a:effectRef idx="0">
+            <a:schemeClr val="accent1"/>
+          </a:effectRef>
+          <a:fontRef idx="minor">
+            <a:schemeClr val="tx1"/>
+          </a:fontRef>
+        </p:style>
+      </p:cxnSp>
+      <p:sp>
+        <p:nvSpPr>
+          <p:cNvPr id="23" name="TextBox 22">
+            <a:extLst>
+              <a:ext uri="{FF2B5EF4-FFF2-40B4-BE49-F238E27FC236}">
+                <a16:creationId xmlns:a16="http://schemas.microsoft.com/office/drawing/2014/main" id="{78BE4CB6-EC21-44A9-AA8E-620FFD9BCB25}"/>
+              </a:ext>
+            </a:extLst>
+          </p:cNvPr>
+          <p:cNvSpPr txBox="1"/>
+          <p:nvPr/>
+        </p:nvSpPr>
+        <p:spPr>
+          <a:xfrm>
+            <a:off x="5396752" y="5107081"/>
+            <a:ext cx="657225" cy="246221"/>
+          </a:xfrm>
+          <a:prstGeom prst="rect">
+            <a:avLst/>
+          </a:prstGeom>
+          <a:noFill/>
+        </p:spPr>
+        <p:txBody>
+          <a:bodyPr rot="0" spcFirstLastPara="0" vertOverflow="overflow" horzOverflow="overflow" vert="horz" wrap="square" lIns="91440" tIns="45720" rIns="91440" bIns="45720" numCol="1" spcCol="0" rtlCol="0" fromWordArt="0" anchor="t" anchorCtr="0" forceAA="0" compatLnSpc="1">
+            <a:prstTxWarp prst="textNoShape">
+              <a:avLst/>
+            </a:prstTxWarp>
+            <a:spAutoFit/>
+          </a:bodyPr>
+          <a:lstStyle/>
+          <a:p>
+            <a:pPr algn="l"/>
+            <a:r>
+              <a:rPr lang="ko-KR" altLang="en-US" sz="1000" dirty="0" err="1">
+                <a:ea typeface="맑은 고딕"/>
+              </a:rPr>
+              <a:t>Ready</a:t>
+            </a:r>
+            <a:endParaRPr lang="ko-KR" sz="1000" dirty="0" err="1">
+              <a:ea typeface="맑은 고딕"/>
+            </a:endParaRPr>
+          </a:p>
+        </p:txBody>
+      </p:sp>
+      <p:sp>
+        <p:nvSpPr>
+          <p:cNvPr id="24" name="TextBox 23">
+            <a:extLst>
+              <a:ext uri="{FF2B5EF4-FFF2-40B4-BE49-F238E27FC236}">
+                <a16:creationId xmlns:a16="http://schemas.microsoft.com/office/drawing/2014/main" id="{C84AE725-92AB-47BF-A67E-A801B60D87B4}"/>
+              </a:ext>
+            </a:extLst>
+          </p:cNvPr>
+          <p:cNvSpPr txBox="1"/>
+          <p:nvPr/>
+        </p:nvSpPr>
+        <p:spPr>
+          <a:xfrm>
+            <a:off x="5374340" y="5757022"/>
+            <a:ext cx="657225" cy="246221"/>
+          </a:xfrm>
+          <a:prstGeom prst="rect">
+            <a:avLst/>
+          </a:prstGeom>
+          <a:noFill/>
+        </p:spPr>
+        <p:txBody>
+          <a:bodyPr rot="0" spcFirstLastPara="0" vertOverflow="overflow" horzOverflow="overflow" vert="horz" wrap="square" lIns="91440" tIns="45720" rIns="91440" bIns="45720" numCol="1" spcCol="0" rtlCol="0" fromWordArt="0" anchor="t" anchorCtr="0" forceAA="0" compatLnSpc="1">
+            <a:prstTxWarp prst="textNoShape">
+              <a:avLst/>
+            </a:prstTxWarp>
+            <a:spAutoFit/>
+          </a:bodyPr>
+          <a:lstStyle/>
+          <a:p>
+            <a:pPr algn="l"/>
+            <a:r>
+              <a:rPr lang="ko-KR" altLang="en-US" sz="1000" dirty="0" err="1">
+                <a:ea typeface="맑은 고딕"/>
+              </a:rPr>
+              <a:t>Ready</a:t>
+            </a:r>
+            <a:endParaRPr lang="ko-KR" sz="1000" dirty="0" err="1">
+              <a:ea typeface="맑은 고딕"/>
+            </a:endParaRPr>
+          </a:p>
+        </p:txBody>
+      </p:sp>
+      <p:sp>
+        <p:nvSpPr>
+          <p:cNvPr id="26" name="TextBox 25">
+            <a:extLst>
+              <a:ext uri="{FF2B5EF4-FFF2-40B4-BE49-F238E27FC236}">
+                <a16:creationId xmlns:a16="http://schemas.microsoft.com/office/drawing/2014/main" id="{CFB4E40F-CF6C-4F01-A009-02C02DC32D7C}"/>
+              </a:ext>
+            </a:extLst>
+          </p:cNvPr>
+          <p:cNvSpPr txBox="1"/>
+          <p:nvPr/>
+        </p:nvSpPr>
+        <p:spPr>
+          <a:xfrm>
+            <a:off x="322169" y="214032"/>
+            <a:ext cx="5559238" cy="369332"/>
+          </a:xfrm>
+          <a:prstGeom prst="rect">
+            <a:avLst/>
+          </a:prstGeom>
+          <a:noFill/>
+        </p:spPr>
+        <p:txBody>
+          <a:bodyPr rot="0" spcFirstLastPara="0" vertOverflow="overflow" horzOverflow="overflow" vert="horz" wrap="square" lIns="91440" tIns="45720" rIns="91440" bIns="45720" numCol="1" spcCol="0" rtlCol="0" fromWordArt="0" anchor="t" anchorCtr="0" forceAA="0" compatLnSpc="1">
+            <a:prstTxWarp prst="textNoShape">
+              <a:avLst/>
+            </a:prstTxWarp>
+            <a:spAutoFit/>
+          </a:bodyPr>
+          <a:lstStyle/>
+          <a:p>
+            <a:r>
+              <a:rPr lang="ko-KR" altLang="en-US" dirty="0" err="1">
+                <a:ea typeface="맑은 고딕"/>
+              </a:rPr>
+              <a:t>Client</a:t>
+            </a:r>
+            <a:r>
+              <a:rPr lang="ko-KR" altLang="en-US" dirty="0">
+                <a:ea typeface="맑은 고딕"/>
+              </a:rPr>
+              <a:t> – Server </a:t>
+            </a:r>
+            <a:r>
+              <a:rPr lang="ko-KR" altLang="en-US" dirty="0" err="1">
+                <a:ea typeface="맑은 고딕"/>
+              </a:rPr>
+              <a:t>Communication</a:t>
+            </a:r>
+            <a:r>
+              <a:rPr lang="ko-KR" altLang="en-US" dirty="0">
+                <a:ea typeface="맑은 고딕"/>
+              </a:rPr>
+              <a:t> RPC </a:t>
+            </a:r>
+            <a:r>
+              <a:rPr lang="ko-KR" altLang="en-US" dirty="0" err="1">
+                <a:ea typeface="맑은 고딕"/>
+              </a:rPr>
+              <a:t>protocol</a:t>
+            </a:r>
+          </a:p>
+        </p:txBody>
+      </p:sp>
+      <p:sp>
+        <p:nvSpPr>
+          <p:cNvPr id="27" name="TextBox 26">
+            <a:extLst>
+              <a:ext uri="{FF2B5EF4-FFF2-40B4-BE49-F238E27FC236}">
+                <a16:creationId xmlns:a16="http://schemas.microsoft.com/office/drawing/2014/main" id="{B15BE06F-81C4-4BFE-A42D-EB5F91BB3AC3}"/>
+              </a:ext>
+            </a:extLst>
+          </p:cNvPr>
+          <p:cNvSpPr txBox="1"/>
+          <p:nvPr/>
+        </p:nvSpPr>
+        <p:spPr>
+          <a:xfrm>
+            <a:off x="1676399" y="2540933"/>
+            <a:ext cx="1374400" cy="246221"/>
+          </a:xfrm>
+          <a:prstGeom prst="rect">
+            <a:avLst/>
+          </a:prstGeom>
+          <a:noFill/>
+        </p:spPr>
+        <p:txBody>
+          <a:bodyPr rot="0" spcFirstLastPara="0" vertOverflow="overflow" horzOverflow="overflow" vert="horz" wrap="square" lIns="91440" tIns="45720" rIns="91440" bIns="45720" numCol="1" spcCol="0" rtlCol="0" fromWordArt="0" anchor="t" anchorCtr="0" forceAA="0" compatLnSpc="1">
+            <a:prstTxWarp prst="textNoShape">
+              <a:avLst/>
+            </a:prstTxWarp>
+            <a:spAutoFit/>
+          </a:bodyPr>
+          <a:lstStyle/>
+          <a:p>
+            <a:r>
+              <a:rPr lang="ko-KR" altLang="en-US" sz="1000" dirty="0" err="1">
+                <a:ea typeface="맑은 고딕"/>
+              </a:rPr>
+              <a:t>Write</a:t>
+            </a:r>
+            <a:r>
+              <a:rPr lang="ko-KR" altLang="en-US" sz="1000" dirty="0">
+                <a:ea typeface="맑은 고딕"/>
+              </a:rPr>
+              <a:t> </a:t>
+            </a:r>
+            <a:r>
+              <a:rPr lang="ko-KR" altLang="en-US" sz="1000" dirty="0" err="1">
+                <a:ea typeface="맑은 고딕"/>
+              </a:rPr>
+              <a:t>Request</a:t>
+            </a:r>
+            <a:r>
+              <a:rPr lang="ko-KR" altLang="en-US" sz="1000" dirty="0">
+                <a:ea typeface="맑은 고딕"/>
+              </a:rPr>
+              <a:t> Data</a:t>
+            </a:r>
+          </a:p>
+        </p:txBody>
+      </p:sp>
+      <p:sp>
+        <p:nvSpPr>
+          <p:cNvPr id="28" name="TextBox 27">
+            <a:extLst>
+              <a:ext uri="{FF2B5EF4-FFF2-40B4-BE49-F238E27FC236}">
+                <a16:creationId xmlns:a16="http://schemas.microsoft.com/office/drawing/2014/main" id="{3E8571AD-787D-4EC4-8C4C-BA93B11D1497}"/>
+              </a:ext>
+            </a:extLst>
+          </p:cNvPr>
+          <p:cNvSpPr txBox="1"/>
+          <p:nvPr/>
+        </p:nvSpPr>
+        <p:spPr>
+          <a:xfrm>
+            <a:off x="8254252" y="3717550"/>
+            <a:ext cx="1374400" cy="246221"/>
+          </a:xfrm>
+          <a:prstGeom prst="rect">
+            <a:avLst/>
+          </a:prstGeom>
+          <a:noFill/>
+        </p:spPr>
+        <p:txBody>
+          <a:bodyPr rot="0" spcFirstLastPara="0" vertOverflow="overflow" horzOverflow="overflow" vert="horz" wrap="square" lIns="91440" tIns="45720" rIns="91440" bIns="45720" numCol="1" spcCol="0" rtlCol="0" fromWordArt="0" anchor="t" anchorCtr="0" forceAA="0" compatLnSpc="1">
+            <a:prstTxWarp prst="textNoShape">
+              <a:avLst/>
+            </a:prstTxWarp>
+            <a:spAutoFit/>
+          </a:bodyPr>
+          <a:lstStyle/>
+          <a:p>
+            <a:r>
+              <a:rPr lang="ko-KR" altLang="en-US" sz="1000" dirty="0" err="1">
+                <a:ea typeface="맑은 고딕"/>
+              </a:rPr>
+              <a:t>Procedure</a:t>
+            </a:r>
+            <a:r>
+              <a:rPr lang="ko-KR" altLang="en-US" sz="1000" dirty="0">
+                <a:ea typeface="맑은 고딕"/>
+              </a:rPr>
+              <a:t> </a:t>
+            </a:r>
+            <a:r>
+              <a:rPr lang="ko-KR" altLang="en-US" sz="1000" dirty="0" err="1">
+                <a:ea typeface="맑은 고딕"/>
+              </a:rPr>
+              <a:t>Call</a:t>
+            </a:r>
+          </a:p>
+        </p:txBody>
+      </p:sp>
+      <p:sp>
+        <p:nvSpPr>
+          <p:cNvPr id="29" name="TextBox 28">
+            <a:extLst>
+              <a:ext uri="{FF2B5EF4-FFF2-40B4-BE49-F238E27FC236}">
+                <a16:creationId xmlns:a16="http://schemas.microsoft.com/office/drawing/2014/main" id="{8936C739-1FD3-4EA1-AA85-7A3DCFBA9AD2}"/>
+              </a:ext>
+            </a:extLst>
+          </p:cNvPr>
+          <p:cNvSpPr txBox="1"/>
+          <p:nvPr/>
+        </p:nvSpPr>
+        <p:spPr>
+          <a:xfrm>
+            <a:off x="8265457" y="3997697"/>
+            <a:ext cx="1576106" cy="246221"/>
+          </a:xfrm>
+          <a:prstGeom prst="rect">
+            <a:avLst/>
+          </a:prstGeom>
+          <a:noFill/>
+        </p:spPr>
+        <p:txBody>
+          <a:bodyPr rot="0" spcFirstLastPara="0" vertOverflow="overflow" horzOverflow="overflow" vert="horz" wrap="square" lIns="91440" tIns="45720" rIns="91440" bIns="45720" numCol="1" spcCol="0" rtlCol="0" fromWordArt="0" anchor="t" anchorCtr="0" forceAA="0" compatLnSpc="1">
+            <a:prstTxWarp prst="textNoShape">
+              <a:avLst/>
+            </a:prstTxWarp>
+            <a:spAutoFit/>
+          </a:bodyPr>
+          <a:lstStyle/>
+          <a:p>
+            <a:r>
+              <a:rPr lang="ko-KR" altLang="en-US" sz="1000" dirty="0" err="1">
+                <a:ea typeface="맑은 고딕"/>
+              </a:rPr>
+              <a:t>Write</a:t>
+            </a:r>
+            <a:r>
+              <a:rPr lang="ko-KR" altLang="en-US" sz="1000" dirty="0">
+                <a:ea typeface="맑은 고딕"/>
+              </a:rPr>
+              <a:t> </a:t>
+            </a:r>
+            <a:r>
+              <a:rPr lang="ko-KR" altLang="en-US" sz="1000" dirty="0" err="1">
+                <a:ea typeface="맑은 고딕"/>
+              </a:rPr>
+              <a:t>Response</a:t>
+            </a:r>
+            <a:r>
+              <a:rPr lang="ko-KR" altLang="en-US" sz="1000" dirty="0">
+                <a:ea typeface="맑은 고딕"/>
+              </a:rPr>
+              <a:t> Data</a:t>
+            </a:r>
+            <a:endParaRPr lang="ko-KR" dirty="0"/>
+          </a:p>
+        </p:txBody>
+      </p:sp>
+      <p:sp>
+        <p:nvSpPr>
+          <p:cNvPr id="30" name="TextBox 29">
+            <a:extLst>
+              <a:ext uri="{FF2B5EF4-FFF2-40B4-BE49-F238E27FC236}">
+                <a16:creationId xmlns:a16="http://schemas.microsoft.com/office/drawing/2014/main" id="{2C0B7683-E1E2-4EE0-BC47-03978CDFBC9F}"/>
+              </a:ext>
+            </a:extLst>
+          </p:cNvPr>
+          <p:cNvSpPr txBox="1"/>
+          <p:nvPr/>
+        </p:nvSpPr>
+        <p:spPr>
+          <a:xfrm>
+            <a:off x="1732427" y="4927785"/>
+            <a:ext cx="1576106" cy="246221"/>
+          </a:xfrm>
+          <a:prstGeom prst="rect">
+            <a:avLst/>
+          </a:prstGeom>
+          <a:noFill/>
+        </p:spPr>
+        <p:txBody>
+          <a:bodyPr rot="0" spcFirstLastPara="0" vertOverflow="overflow" horzOverflow="overflow" vert="horz" wrap="square" lIns="91440" tIns="45720" rIns="91440" bIns="45720" numCol="1" spcCol="0" rtlCol="0" fromWordArt="0" anchor="t" anchorCtr="0" forceAA="0" compatLnSpc="1">
+            <a:prstTxWarp prst="textNoShape">
+              <a:avLst/>
+            </a:prstTxWarp>
+            <a:spAutoFit/>
+          </a:bodyPr>
+          <a:lstStyle/>
+          <a:p>
+            <a:r>
+              <a:rPr lang="ko-KR" altLang="en-US" sz="1000" dirty="0" err="1">
+                <a:ea typeface="맑은 고딕"/>
+              </a:rPr>
+              <a:t>Read</a:t>
+            </a:r>
+            <a:r>
+              <a:rPr lang="ko-KR" altLang="en-US" sz="1000" dirty="0">
+                <a:ea typeface="맑은 고딕"/>
+              </a:rPr>
+              <a:t> </a:t>
+            </a:r>
+            <a:r>
+              <a:rPr lang="ko-KR" altLang="en-US" sz="1000" dirty="0" err="1">
+                <a:ea typeface="맑은 고딕"/>
+              </a:rPr>
+              <a:t>Response</a:t>
+            </a:r>
+            <a:r>
+              <a:rPr lang="ko-KR" altLang="en-US" sz="1000" dirty="0">
+                <a:ea typeface="맑은 고딕"/>
+              </a:rPr>
+              <a:t> Data</a:t>
+            </a:r>
+            <a:endParaRPr lang="ko-KR" dirty="0"/>
+          </a:p>
+        </p:txBody>
+      </p:sp>
+    </p:spTree>
+    <p:extLst>
+      <p:ext uri="{BB962C8B-B14F-4D97-AF65-F5344CB8AC3E}">
+        <p14:creationId xmlns:p14="http://schemas.microsoft.com/office/powerpoint/2010/main" val="3711737496"/>
+      </p:ext>
+    </p:extLst>
+  </p:cSld>
+  <p:clrMapOvr>
+    <a:masterClrMapping/>
+  </p:clrMapOvr>
+</p:sld>
+</file>
+
 <file path=ppt/theme/theme1.xml><?xml version="1.0" encoding="utf-8"?>
 <a:theme xmlns:a="http://schemas.openxmlformats.org/drawingml/2006/main" name="Office 테마">
   <a:themeElements>

</xml_diff>

<commit_message>
Changed the status name from UNDEFINED to REJECT
</commit_message>
<xml_diff>
--- a/doc/Single Communication Buffer Based RPC Model.pptx
+++ b/doc/Single Communication Buffer Based RPC Model.pptx
@@ -118,6 +118,7 @@
   <p1510:revLst>
     <p1510:client id="{6F8FD5B7-3F20-483A-A14D-DB24B9FBE73D}" v="328" dt="2021-07-25T14:18:53.733"/>
     <p1510:client id="{D6AB13BE-EE0D-4238-9597-DB02E4C747E4}" v="697" dt="2021-07-24T15:00:55.996"/>
+    <p1510:client id="{FEF49F7C-6954-4EF2-9AF1-4B36DF6A16DC}" v="51" dt="2021-07-26T12:47:04.429"/>
   </p1510:revLst>
 </p1510:revInfo>
 </file>
@@ -251,7 +252,7 @@
           <a:p>
             <a:fld id="{2566825D-2B69-4989-8861-A6901ABADB6C}" type="datetimeFigureOut">
               <a:rPr lang="ko-KR" altLang="en-US" smtClean="0"/>
-              <a:t>2021-07-25</a:t>
+              <a:t>2021-07-26</a:t>
             </a:fld>
             <a:endParaRPr lang="ko-KR" altLang="en-US"/>
           </a:p>
@@ -419,7 +420,7 @@
           <a:p>
             <a:fld id="{2566825D-2B69-4989-8861-A6901ABADB6C}" type="datetimeFigureOut">
               <a:rPr lang="ko-KR" altLang="en-US" smtClean="0"/>
-              <a:t>2021-07-25</a:t>
+              <a:t>2021-07-26</a:t>
             </a:fld>
             <a:endParaRPr lang="ko-KR" altLang="en-US"/>
           </a:p>
@@ -597,7 +598,7 @@
           <a:p>
             <a:fld id="{2566825D-2B69-4989-8861-A6901ABADB6C}" type="datetimeFigureOut">
               <a:rPr lang="ko-KR" altLang="en-US" smtClean="0"/>
-              <a:t>2021-07-25</a:t>
+              <a:t>2021-07-26</a:t>
             </a:fld>
             <a:endParaRPr lang="ko-KR" altLang="en-US"/>
           </a:p>
@@ -765,7 +766,7 @@
           <a:p>
             <a:fld id="{2566825D-2B69-4989-8861-A6901ABADB6C}" type="datetimeFigureOut">
               <a:rPr lang="ko-KR" altLang="en-US" smtClean="0"/>
-              <a:t>2021-07-25</a:t>
+              <a:t>2021-07-26</a:t>
             </a:fld>
             <a:endParaRPr lang="ko-KR" altLang="en-US"/>
           </a:p>
@@ -1010,7 +1011,7 @@
           <a:p>
             <a:fld id="{2566825D-2B69-4989-8861-A6901ABADB6C}" type="datetimeFigureOut">
               <a:rPr lang="ko-KR" altLang="en-US" smtClean="0"/>
-              <a:t>2021-07-25</a:t>
+              <a:t>2021-07-26</a:t>
             </a:fld>
             <a:endParaRPr lang="ko-KR" altLang="en-US"/>
           </a:p>
@@ -1239,7 +1240,7 @@
           <a:p>
             <a:fld id="{2566825D-2B69-4989-8861-A6901ABADB6C}" type="datetimeFigureOut">
               <a:rPr lang="ko-KR" altLang="en-US" smtClean="0"/>
-              <a:t>2021-07-25</a:t>
+              <a:t>2021-07-26</a:t>
             </a:fld>
             <a:endParaRPr lang="ko-KR" altLang="en-US"/>
           </a:p>
@@ -1603,7 +1604,7 @@
           <a:p>
             <a:fld id="{2566825D-2B69-4989-8861-A6901ABADB6C}" type="datetimeFigureOut">
               <a:rPr lang="ko-KR" altLang="en-US" smtClean="0"/>
-              <a:t>2021-07-25</a:t>
+              <a:t>2021-07-26</a:t>
             </a:fld>
             <a:endParaRPr lang="ko-KR" altLang="en-US"/>
           </a:p>
@@ -1720,7 +1721,7 @@
           <a:p>
             <a:fld id="{2566825D-2B69-4989-8861-A6901ABADB6C}" type="datetimeFigureOut">
               <a:rPr lang="ko-KR" altLang="en-US" smtClean="0"/>
-              <a:t>2021-07-25</a:t>
+              <a:t>2021-07-26</a:t>
             </a:fld>
             <a:endParaRPr lang="ko-KR" altLang="en-US"/>
           </a:p>
@@ -1815,7 +1816,7 @@
           <a:p>
             <a:fld id="{2566825D-2B69-4989-8861-A6901ABADB6C}" type="datetimeFigureOut">
               <a:rPr lang="ko-KR" altLang="en-US" smtClean="0"/>
-              <a:t>2021-07-25</a:t>
+              <a:t>2021-07-26</a:t>
             </a:fld>
             <a:endParaRPr lang="ko-KR" altLang="en-US"/>
           </a:p>
@@ -2090,7 +2091,7 @@
           <a:p>
             <a:fld id="{2566825D-2B69-4989-8861-A6901ABADB6C}" type="datetimeFigureOut">
               <a:rPr lang="ko-KR" altLang="en-US" smtClean="0"/>
-              <a:t>2021-07-25</a:t>
+              <a:t>2021-07-26</a:t>
             </a:fld>
             <a:endParaRPr lang="ko-KR" altLang="en-US"/>
           </a:p>
@@ -2342,7 +2343,7 @@
           <a:p>
             <a:fld id="{2566825D-2B69-4989-8861-A6901ABADB6C}" type="datetimeFigureOut">
               <a:rPr lang="ko-KR" altLang="en-US" smtClean="0"/>
-              <a:t>2021-07-25</a:t>
+              <a:t>2021-07-26</a:t>
             </a:fld>
             <a:endParaRPr lang="ko-KR" altLang="en-US"/>
           </a:p>
@@ -2553,7 +2554,7 @@
           <a:p>
             <a:fld id="{2566825D-2B69-4989-8861-A6901ABADB6C}" type="datetimeFigureOut">
               <a:rPr lang="ko-KR" altLang="en-US" smtClean="0"/>
-              <a:t>2021-07-25</a:t>
+              <a:t>2021-07-26</a:t>
             </a:fld>
             <a:endParaRPr lang="ko-KR" altLang="en-US"/>
           </a:p>
@@ -5527,8 +5528,8 @@
         </p:nvSpPr>
         <p:spPr>
           <a:xfrm>
-            <a:off x="5374341" y="3471022"/>
-            <a:ext cx="657225" cy="246221"/>
+            <a:off x="5105399" y="3426199"/>
+            <a:ext cx="1195108" cy="246221"/>
           </a:xfrm>
           <a:prstGeom prst="rect">
             <a:avLst/>
@@ -5544,12 +5545,35 @@
           </a:bodyPr>
           <a:lstStyle/>
           <a:p>
-            <a:pPr algn="l"/>
             <a:r>
               <a:rPr lang="ko-KR" altLang="en-US" sz="1000" dirty="0" err="1">
                 <a:ea typeface="맑은 고딕"/>
               </a:rPr>
               <a:t>Accept</a:t>
+            </a:r>
+            <a:r>
+              <a:rPr lang="ko-KR" altLang="en-US" sz="1000" dirty="0">
+                <a:ea typeface="맑은 고딕"/>
+              </a:rPr>
+              <a:t> </a:t>
+            </a:r>
+            <a:r>
+              <a:rPr lang="ko-KR" altLang="en-US" sz="1000" dirty="0" err="1">
+                <a:ea typeface="맑은 고딕"/>
+              </a:rPr>
+              <a:t>or</a:t>
+            </a:r>
+            <a:r>
+              <a:rPr lang="ko-KR" altLang="en-US" sz="1000" dirty="0">
+                <a:ea typeface="맑은 고딕"/>
+              </a:rPr>
+              <a:t> </a:t>
+            </a:r>
+            <a:r>
+              <a:rPr lang="ko-KR" altLang="en-US" sz="1000" dirty="0" err="1">
+                <a:ea typeface="맑은 고딕"/>
+              </a:rPr>
+              <a:t>Reject</a:t>
             </a:r>
             <a:endParaRPr lang="ko-KR" sz="1000" dirty="0" err="1">
               <a:ea typeface="맑은 고딕"/>
@@ -5571,8 +5595,8 @@
         </p:nvSpPr>
         <p:spPr>
           <a:xfrm>
-            <a:off x="4802841" y="4457140"/>
-            <a:ext cx="657225" cy="246221"/>
+            <a:off x="5139018" y="4457140"/>
+            <a:ext cx="1195107" cy="246221"/>
           </a:xfrm>
           <a:prstGeom prst="rect">
             <a:avLst/>
@@ -5588,50 +5612,18 @@
           </a:bodyPr>
           <a:lstStyle/>
           <a:p>
-            <a:pPr algn="l"/>
             <a:r>
               <a:rPr lang="ko-KR" altLang="en-US" sz="1000" dirty="0" err="1">
                 <a:ea typeface="맑은 고딕"/>
               </a:rPr>
               <a:t>Finish</a:t>
             </a:r>
-            <a:endParaRPr lang="ko-KR" sz="1000" dirty="0" err="1">
-              <a:ea typeface="맑은 고딕"/>
-            </a:endParaRPr>
-          </a:p>
-        </p:txBody>
-      </p:sp>
-      <p:sp>
-        <p:nvSpPr>
-          <p:cNvPr id="20" name="TextBox 19">
-            <a:extLst>
-              <a:ext uri="{FF2B5EF4-FFF2-40B4-BE49-F238E27FC236}">
-                <a16:creationId xmlns:a16="http://schemas.microsoft.com/office/drawing/2014/main" id="{E0C264EE-4FD6-4DC9-9F0E-E53F6CEF5B32}"/>
-              </a:ext>
-            </a:extLst>
-          </p:cNvPr>
-          <p:cNvSpPr txBox="1"/>
-          <p:nvPr/>
-        </p:nvSpPr>
-        <p:spPr>
-          <a:xfrm>
-            <a:off x="5262282" y="4457139"/>
-            <a:ext cx="1520077" cy="246221"/>
-          </a:xfrm>
-          <a:prstGeom prst="rect">
-            <a:avLst/>
-          </a:prstGeom>
-          <a:noFill/>
-        </p:spPr>
-        <p:txBody>
-          <a:bodyPr rot="0" spcFirstLastPara="0" vertOverflow="overflow" horzOverflow="overflow" vert="horz" wrap="square" lIns="91440" tIns="45720" rIns="91440" bIns="45720" numCol="1" spcCol="0" rtlCol="0" fromWordArt="0" anchor="t" anchorCtr="0" forceAA="0" compatLnSpc="1">
-            <a:prstTxWarp prst="textNoShape">
-              <a:avLst/>
-            </a:prstTxWarp>
-            <a:spAutoFit/>
-          </a:bodyPr>
-          <a:lstStyle/>
-          <a:p>
+            <a:r>
+              <a:rPr lang="ko-KR" altLang="en-US" sz="1000" dirty="0">
+                <a:ea typeface="맑은 고딕"/>
+              </a:rPr>
+              <a:t> </a:t>
+            </a:r>
             <a:r>
               <a:rPr lang="ko-KR" altLang="en-US" sz="1000" dirty="0" err="1">
                 <a:ea typeface="맑은 고딕"/>
@@ -5642,31 +5634,13 @@
               <a:rPr lang="ko-KR" altLang="en-US" sz="1000" dirty="0">
                 <a:ea typeface="맑은 고딕"/>
               </a:rPr>
-              <a:t> (</a:t>
+              <a:t> </a:t>
             </a:r>
             <a:r>
               <a:rPr lang="ko-KR" altLang="en-US" sz="1000" dirty="0" err="1">
                 <a:ea typeface="맑은 고딕"/>
               </a:rPr>
               <a:t>Error</a:t>
-            </a:r>
-            <a:r>
-              <a:rPr lang="ko-KR" altLang="en-US" sz="1000" dirty="0">
-                <a:ea typeface="맑은 고딕"/>
-              </a:rPr>
-              <a:t>, </a:t>
-            </a:r>
-            <a:r>
-              <a:rPr lang="ko-KR" altLang="en-US" sz="1000" dirty="0" err="1">
-                <a:ea typeface="맑은 고딕"/>
-              </a:rPr>
-              <a:t>Undefined</a:t>
-            </a:r>
-            <a:r>
-              <a:rPr lang="ko-KR" altLang="en-US" sz="1000" dirty="0">
-                <a:ea typeface="맑은 고딕"/>
-              </a:rPr>
-              <a:t>)</a:t>
             </a:r>
             <a:endParaRPr lang="ko-KR" sz="1000" dirty="0" err="1">
               <a:ea typeface="맑은 고딕"/>

</xml_diff>

<commit_message>
Merge with the branch
</commit_message>
<xml_diff>
--- a/doc/Single Communication Buffer Based RPC Model.pptx
+++ b/doc/Single Communication Buffer Based RPC Model.pptx
@@ -118,6 +118,7 @@
   <p1510:revLst>
     <p1510:client id="{6F8FD5B7-3F20-483A-A14D-DB24B9FBE73D}" v="328" dt="2021-07-25T14:18:53.733"/>
     <p1510:client id="{D6AB13BE-EE0D-4238-9597-DB02E4C747E4}" v="697" dt="2021-07-24T15:00:55.996"/>
+    <p1510:client id="{FEF49F7C-6954-4EF2-9AF1-4B36DF6A16DC}" v="51" dt="2021-07-26T12:47:04.429"/>
   </p1510:revLst>
 </p1510:revInfo>
 </file>
@@ -251,7 +252,7 @@
           <a:p>
             <a:fld id="{2566825D-2B69-4989-8861-A6901ABADB6C}" type="datetimeFigureOut">
               <a:rPr lang="ko-KR" altLang="en-US" smtClean="0"/>
-              <a:t>2021-07-25</a:t>
+              <a:t>2021-07-26</a:t>
             </a:fld>
             <a:endParaRPr lang="ko-KR" altLang="en-US"/>
           </a:p>
@@ -419,7 +420,7 @@
           <a:p>
             <a:fld id="{2566825D-2B69-4989-8861-A6901ABADB6C}" type="datetimeFigureOut">
               <a:rPr lang="ko-KR" altLang="en-US" smtClean="0"/>
-              <a:t>2021-07-25</a:t>
+              <a:t>2021-07-26</a:t>
             </a:fld>
             <a:endParaRPr lang="ko-KR" altLang="en-US"/>
           </a:p>
@@ -597,7 +598,7 @@
           <a:p>
             <a:fld id="{2566825D-2B69-4989-8861-A6901ABADB6C}" type="datetimeFigureOut">
               <a:rPr lang="ko-KR" altLang="en-US" smtClean="0"/>
-              <a:t>2021-07-25</a:t>
+              <a:t>2021-07-26</a:t>
             </a:fld>
             <a:endParaRPr lang="ko-KR" altLang="en-US"/>
           </a:p>
@@ -765,7 +766,7 @@
           <a:p>
             <a:fld id="{2566825D-2B69-4989-8861-A6901ABADB6C}" type="datetimeFigureOut">
               <a:rPr lang="ko-KR" altLang="en-US" smtClean="0"/>
-              <a:t>2021-07-25</a:t>
+              <a:t>2021-07-26</a:t>
             </a:fld>
             <a:endParaRPr lang="ko-KR" altLang="en-US"/>
           </a:p>
@@ -1010,7 +1011,7 @@
           <a:p>
             <a:fld id="{2566825D-2B69-4989-8861-A6901ABADB6C}" type="datetimeFigureOut">
               <a:rPr lang="ko-KR" altLang="en-US" smtClean="0"/>
-              <a:t>2021-07-25</a:t>
+              <a:t>2021-07-26</a:t>
             </a:fld>
             <a:endParaRPr lang="ko-KR" altLang="en-US"/>
           </a:p>
@@ -1239,7 +1240,7 @@
           <a:p>
             <a:fld id="{2566825D-2B69-4989-8861-A6901ABADB6C}" type="datetimeFigureOut">
               <a:rPr lang="ko-KR" altLang="en-US" smtClean="0"/>
-              <a:t>2021-07-25</a:t>
+              <a:t>2021-07-26</a:t>
             </a:fld>
             <a:endParaRPr lang="ko-KR" altLang="en-US"/>
           </a:p>
@@ -1603,7 +1604,7 @@
           <a:p>
             <a:fld id="{2566825D-2B69-4989-8861-A6901ABADB6C}" type="datetimeFigureOut">
               <a:rPr lang="ko-KR" altLang="en-US" smtClean="0"/>
-              <a:t>2021-07-25</a:t>
+              <a:t>2021-07-26</a:t>
             </a:fld>
             <a:endParaRPr lang="ko-KR" altLang="en-US"/>
           </a:p>
@@ -1720,7 +1721,7 @@
           <a:p>
             <a:fld id="{2566825D-2B69-4989-8861-A6901ABADB6C}" type="datetimeFigureOut">
               <a:rPr lang="ko-KR" altLang="en-US" smtClean="0"/>
-              <a:t>2021-07-25</a:t>
+              <a:t>2021-07-26</a:t>
             </a:fld>
             <a:endParaRPr lang="ko-KR" altLang="en-US"/>
           </a:p>
@@ -1815,7 +1816,7 @@
           <a:p>
             <a:fld id="{2566825D-2B69-4989-8861-A6901ABADB6C}" type="datetimeFigureOut">
               <a:rPr lang="ko-KR" altLang="en-US" smtClean="0"/>
-              <a:t>2021-07-25</a:t>
+              <a:t>2021-07-26</a:t>
             </a:fld>
             <a:endParaRPr lang="ko-KR" altLang="en-US"/>
           </a:p>
@@ -2090,7 +2091,7 @@
           <a:p>
             <a:fld id="{2566825D-2B69-4989-8861-A6901ABADB6C}" type="datetimeFigureOut">
               <a:rPr lang="ko-KR" altLang="en-US" smtClean="0"/>
-              <a:t>2021-07-25</a:t>
+              <a:t>2021-07-26</a:t>
             </a:fld>
             <a:endParaRPr lang="ko-KR" altLang="en-US"/>
           </a:p>
@@ -2342,7 +2343,7 @@
           <a:p>
             <a:fld id="{2566825D-2B69-4989-8861-A6901ABADB6C}" type="datetimeFigureOut">
               <a:rPr lang="ko-KR" altLang="en-US" smtClean="0"/>
-              <a:t>2021-07-25</a:t>
+              <a:t>2021-07-26</a:t>
             </a:fld>
             <a:endParaRPr lang="ko-KR" altLang="en-US"/>
           </a:p>
@@ -2553,7 +2554,7 @@
           <a:p>
             <a:fld id="{2566825D-2B69-4989-8861-A6901ABADB6C}" type="datetimeFigureOut">
               <a:rPr lang="ko-KR" altLang="en-US" smtClean="0"/>
-              <a:t>2021-07-25</a:t>
+              <a:t>2021-07-26</a:t>
             </a:fld>
             <a:endParaRPr lang="ko-KR" altLang="en-US"/>
           </a:p>
@@ -5527,8 +5528,8 @@
         </p:nvSpPr>
         <p:spPr>
           <a:xfrm>
-            <a:off x="5374341" y="3471022"/>
-            <a:ext cx="657225" cy="246221"/>
+            <a:off x="5105399" y="3426199"/>
+            <a:ext cx="1195108" cy="246221"/>
           </a:xfrm>
           <a:prstGeom prst="rect">
             <a:avLst/>
@@ -5544,12 +5545,35 @@
           </a:bodyPr>
           <a:lstStyle/>
           <a:p>
-            <a:pPr algn="l"/>
             <a:r>
               <a:rPr lang="ko-KR" altLang="en-US" sz="1000" dirty="0" err="1">
                 <a:ea typeface="맑은 고딕"/>
               </a:rPr>
               <a:t>Accept</a:t>
+            </a:r>
+            <a:r>
+              <a:rPr lang="ko-KR" altLang="en-US" sz="1000" dirty="0">
+                <a:ea typeface="맑은 고딕"/>
+              </a:rPr>
+              <a:t> </a:t>
+            </a:r>
+            <a:r>
+              <a:rPr lang="ko-KR" altLang="en-US" sz="1000" dirty="0" err="1">
+                <a:ea typeface="맑은 고딕"/>
+              </a:rPr>
+              <a:t>or</a:t>
+            </a:r>
+            <a:r>
+              <a:rPr lang="ko-KR" altLang="en-US" sz="1000" dirty="0">
+                <a:ea typeface="맑은 고딕"/>
+              </a:rPr>
+              <a:t> </a:t>
+            </a:r>
+            <a:r>
+              <a:rPr lang="ko-KR" altLang="en-US" sz="1000" dirty="0" err="1">
+                <a:ea typeface="맑은 고딕"/>
+              </a:rPr>
+              <a:t>Reject</a:t>
             </a:r>
             <a:endParaRPr lang="ko-KR" sz="1000" dirty="0" err="1">
               <a:ea typeface="맑은 고딕"/>
@@ -5571,8 +5595,8 @@
         </p:nvSpPr>
         <p:spPr>
           <a:xfrm>
-            <a:off x="4802841" y="4457140"/>
-            <a:ext cx="657225" cy="246221"/>
+            <a:off x="5139018" y="4457140"/>
+            <a:ext cx="1195107" cy="246221"/>
           </a:xfrm>
           <a:prstGeom prst="rect">
             <a:avLst/>
@@ -5588,50 +5612,18 @@
           </a:bodyPr>
           <a:lstStyle/>
           <a:p>
-            <a:pPr algn="l"/>
             <a:r>
               <a:rPr lang="ko-KR" altLang="en-US" sz="1000" dirty="0" err="1">
                 <a:ea typeface="맑은 고딕"/>
               </a:rPr>
               <a:t>Finish</a:t>
             </a:r>
-            <a:endParaRPr lang="ko-KR" sz="1000" dirty="0" err="1">
-              <a:ea typeface="맑은 고딕"/>
-            </a:endParaRPr>
-          </a:p>
-        </p:txBody>
-      </p:sp>
-      <p:sp>
-        <p:nvSpPr>
-          <p:cNvPr id="20" name="TextBox 19">
-            <a:extLst>
-              <a:ext uri="{FF2B5EF4-FFF2-40B4-BE49-F238E27FC236}">
-                <a16:creationId xmlns:a16="http://schemas.microsoft.com/office/drawing/2014/main" id="{E0C264EE-4FD6-4DC9-9F0E-E53F6CEF5B32}"/>
-              </a:ext>
-            </a:extLst>
-          </p:cNvPr>
-          <p:cNvSpPr txBox="1"/>
-          <p:nvPr/>
-        </p:nvSpPr>
-        <p:spPr>
-          <a:xfrm>
-            <a:off x="5262282" y="4457139"/>
-            <a:ext cx="1520077" cy="246221"/>
-          </a:xfrm>
-          <a:prstGeom prst="rect">
-            <a:avLst/>
-          </a:prstGeom>
-          <a:noFill/>
-        </p:spPr>
-        <p:txBody>
-          <a:bodyPr rot="0" spcFirstLastPara="0" vertOverflow="overflow" horzOverflow="overflow" vert="horz" wrap="square" lIns="91440" tIns="45720" rIns="91440" bIns="45720" numCol="1" spcCol="0" rtlCol="0" fromWordArt="0" anchor="t" anchorCtr="0" forceAA="0" compatLnSpc="1">
-            <a:prstTxWarp prst="textNoShape">
-              <a:avLst/>
-            </a:prstTxWarp>
-            <a:spAutoFit/>
-          </a:bodyPr>
-          <a:lstStyle/>
-          <a:p>
+            <a:r>
+              <a:rPr lang="ko-KR" altLang="en-US" sz="1000" dirty="0">
+                <a:ea typeface="맑은 고딕"/>
+              </a:rPr>
+              <a:t> </a:t>
+            </a:r>
             <a:r>
               <a:rPr lang="ko-KR" altLang="en-US" sz="1000" dirty="0" err="1">
                 <a:ea typeface="맑은 고딕"/>
@@ -5642,31 +5634,13 @@
               <a:rPr lang="ko-KR" altLang="en-US" sz="1000" dirty="0">
                 <a:ea typeface="맑은 고딕"/>
               </a:rPr>
-              <a:t> (</a:t>
+              <a:t> </a:t>
             </a:r>
             <a:r>
               <a:rPr lang="ko-KR" altLang="en-US" sz="1000" dirty="0" err="1">
                 <a:ea typeface="맑은 고딕"/>
               </a:rPr>
               <a:t>Error</a:t>
-            </a:r>
-            <a:r>
-              <a:rPr lang="ko-KR" altLang="en-US" sz="1000" dirty="0">
-                <a:ea typeface="맑은 고딕"/>
-              </a:rPr>
-              <a:t>, </a:t>
-            </a:r>
-            <a:r>
-              <a:rPr lang="ko-KR" altLang="en-US" sz="1000" dirty="0" err="1">
-                <a:ea typeface="맑은 고딕"/>
-              </a:rPr>
-              <a:t>Undefined</a:t>
-            </a:r>
-            <a:r>
-              <a:rPr lang="ko-KR" altLang="en-US" sz="1000" dirty="0">
-                <a:ea typeface="맑은 고딕"/>
-              </a:rPr>
-              <a:t>)</a:t>
             </a:r>
             <a:endParaRPr lang="ko-KR" sz="1000" dirty="0" err="1">
               <a:ea typeface="맑은 고딕"/>

</xml_diff>